<commit_message>
Images galore. Work to be done on appendices next
</commit_message>
<xml_diff>
--- a/LHC_MKI/figures/cross_section.pptx
+++ b/LHC_MKI/figures/cross_section.pptx
@@ -288,7 +288,7 @@
           <a:p>
             <a:fld id="{C3EAF0B1-1327-48BB-81F2-5CFDDF0B3E29}" type="datetimeFigureOut">
               <a:rPr lang="en-GB" smtClean="0"/>
-              <a:t>28/11/2012</a:t>
+              <a:t>15/02/2013</a:t>
             </a:fld>
             <a:endParaRPr lang="en-GB"/>
           </a:p>
@@ -453,7 +453,7 @@
           <a:p>
             <a:fld id="{C3EAF0B1-1327-48BB-81F2-5CFDDF0B3E29}" type="datetimeFigureOut">
               <a:rPr lang="en-GB" smtClean="0"/>
-              <a:t>28/11/2012</a:t>
+              <a:t>15/02/2013</a:t>
             </a:fld>
             <a:endParaRPr lang="en-GB"/>
           </a:p>
@@ -628,7 +628,7 @@
           <a:p>
             <a:fld id="{C3EAF0B1-1327-48BB-81F2-5CFDDF0B3E29}" type="datetimeFigureOut">
               <a:rPr lang="en-GB" smtClean="0"/>
-              <a:t>28/11/2012</a:t>
+              <a:t>15/02/2013</a:t>
             </a:fld>
             <a:endParaRPr lang="en-GB"/>
           </a:p>
@@ -793,7 +793,7 @@
           <a:p>
             <a:fld id="{C3EAF0B1-1327-48BB-81F2-5CFDDF0B3E29}" type="datetimeFigureOut">
               <a:rPr lang="en-GB" smtClean="0"/>
-              <a:t>28/11/2012</a:t>
+              <a:t>15/02/2013</a:t>
             </a:fld>
             <a:endParaRPr lang="en-GB"/>
           </a:p>
@@ -1034,7 +1034,7 @@
           <a:p>
             <a:fld id="{C3EAF0B1-1327-48BB-81F2-5CFDDF0B3E29}" type="datetimeFigureOut">
               <a:rPr lang="en-GB" smtClean="0"/>
-              <a:t>28/11/2012</a:t>
+              <a:t>15/02/2013</a:t>
             </a:fld>
             <a:endParaRPr lang="en-GB"/>
           </a:p>
@@ -1317,7 +1317,7 @@
           <a:p>
             <a:fld id="{C3EAF0B1-1327-48BB-81F2-5CFDDF0B3E29}" type="datetimeFigureOut">
               <a:rPr lang="en-GB" smtClean="0"/>
-              <a:t>28/11/2012</a:t>
+              <a:t>15/02/2013</a:t>
             </a:fld>
             <a:endParaRPr lang="en-GB"/>
           </a:p>
@@ -1734,7 +1734,7 @@
           <a:p>
             <a:fld id="{C3EAF0B1-1327-48BB-81F2-5CFDDF0B3E29}" type="datetimeFigureOut">
               <a:rPr lang="en-GB" smtClean="0"/>
-              <a:t>28/11/2012</a:t>
+              <a:t>15/02/2013</a:t>
             </a:fld>
             <a:endParaRPr lang="en-GB"/>
           </a:p>
@@ -1847,7 +1847,7 @@
           <a:p>
             <a:fld id="{C3EAF0B1-1327-48BB-81F2-5CFDDF0B3E29}" type="datetimeFigureOut">
               <a:rPr lang="en-GB" smtClean="0"/>
-              <a:t>28/11/2012</a:t>
+              <a:t>15/02/2013</a:t>
             </a:fld>
             <a:endParaRPr lang="en-GB"/>
           </a:p>
@@ -1937,7 +1937,7 @@
           <a:p>
             <a:fld id="{C3EAF0B1-1327-48BB-81F2-5CFDDF0B3E29}" type="datetimeFigureOut">
               <a:rPr lang="en-GB" smtClean="0"/>
-              <a:t>28/11/2012</a:t>
+              <a:t>15/02/2013</a:t>
             </a:fld>
             <a:endParaRPr lang="en-GB"/>
           </a:p>
@@ -2209,7 +2209,7 @@
           <a:p>
             <a:fld id="{C3EAF0B1-1327-48BB-81F2-5CFDDF0B3E29}" type="datetimeFigureOut">
               <a:rPr lang="en-GB" smtClean="0"/>
-              <a:t>28/11/2012</a:t>
+              <a:t>15/02/2013</a:t>
             </a:fld>
             <a:endParaRPr lang="en-GB"/>
           </a:p>
@@ -2457,7 +2457,7 @@
           <a:p>
             <a:fld id="{C3EAF0B1-1327-48BB-81F2-5CFDDF0B3E29}" type="datetimeFigureOut">
               <a:rPr lang="en-GB" smtClean="0"/>
-              <a:t>28/11/2012</a:t>
+              <a:t>15/02/2013</a:t>
             </a:fld>
             <a:endParaRPr lang="en-GB"/>
           </a:p>
@@ -2665,7 +2665,7 @@
           <a:p>
             <a:fld id="{C3EAF0B1-1327-48BB-81F2-5CFDDF0B3E29}" type="datetimeFigureOut">
               <a:rPr lang="en-GB" smtClean="0"/>
-              <a:t>28/11/2012</a:t>
+              <a:t>15/02/2013</a:t>
             </a:fld>
             <a:endParaRPr lang="en-GB"/>
           </a:p>
@@ -3386,11 +3386,11 @@
             <a:avLst/>
           </a:prstGeom>
           <a:solidFill>
-            <a:schemeClr val="tx1"/>
+            <a:srgbClr val="FF0000"/>
           </a:solidFill>
           <a:ln>
             <a:solidFill>
-              <a:schemeClr val="tx1"/>
+              <a:srgbClr val="FF0000"/>
             </a:solidFill>
           </a:ln>
         </p:spPr>
@@ -3434,11 +3434,11 @@
             <a:avLst/>
           </a:prstGeom>
           <a:solidFill>
-            <a:schemeClr val="tx1"/>
+            <a:srgbClr val="FF0000"/>
           </a:solidFill>
           <a:ln>
             <a:solidFill>
-              <a:schemeClr val="tx1"/>
+              <a:srgbClr val="FF0000"/>
             </a:solidFill>
           </a:ln>
         </p:spPr>
@@ -3578,11 +3578,11 @@
             <a:avLst/>
           </a:prstGeom>
           <a:solidFill>
-            <a:schemeClr val="tx1"/>
+            <a:srgbClr val="FF0000"/>
           </a:solidFill>
           <a:ln>
             <a:solidFill>
-              <a:schemeClr val="tx1"/>
+              <a:srgbClr val="FF0000"/>
             </a:solidFill>
           </a:ln>
         </p:spPr>
@@ -3914,11 +3914,11 @@
             <a:avLst/>
           </a:prstGeom>
           <a:solidFill>
-            <a:schemeClr val="tx1"/>
+            <a:srgbClr val="FF0000"/>
           </a:solidFill>
           <a:ln>
             <a:solidFill>
-              <a:schemeClr val="tx1"/>
+              <a:srgbClr val="FF0000"/>
             </a:solidFill>
           </a:ln>
         </p:spPr>
@@ -4010,11 +4010,11 @@
             <a:avLst/>
           </a:prstGeom>
           <a:solidFill>
-            <a:schemeClr val="tx1"/>
+            <a:srgbClr val="FF0000"/>
           </a:solidFill>
           <a:ln>
             <a:solidFill>
-              <a:schemeClr val="tx1"/>
+              <a:srgbClr val="FF0000"/>
             </a:solidFill>
           </a:ln>
         </p:spPr>
@@ -4058,11 +4058,11 @@
             <a:avLst/>
           </a:prstGeom>
           <a:solidFill>
-            <a:schemeClr val="tx1"/>
+            <a:srgbClr val="FF0000"/>
           </a:solidFill>
           <a:ln>
             <a:solidFill>
-              <a:schemeClr val="tx1"/>
+              <a:srgbClr val="FF0000"/>
             </a:solidFill>
           </a:ln>
         </p:spPr>
@@ -4272,11 +4272,11 @@
             <a:avLst/>
           </a:prstGeom>
           <a:solidFill>
-            <a:schemeClr val="tx1"/>
+            <a:srgbClr val="FF0000"/>
           </a:solidFill>
           <a:ln>
             <a:solidFill>
-              <a:schemeClr val="tx1"/>
+              <a:srgbClr val="FF0000"/>
             </a:solidFill>
           </a:ln>
         </p:spPr>
@@ -4320,11 +4320,11 @@
             <a:avLst/>
           </a:prstGeom>
           <a:solidFill>
-            <a:schemeClr val="tx1"/>
+            <a:srgbClr val="FF0000"/>
           </a:solidFill>
           <a:ln>
             <a:solidFill>
-              <a:schemeClr val="tx1"/>
+              <a:srgbClr val="FF0000"/>
             </a:solidFill>
           </a:ln>
         </p:spPr>
@@ -4368,11 +4368,11 @@
             <a:avLst/>
           </a:prstGeom>
           <a:solidFill>
-            <a:schemeClr val="tx1"/>
+            <a:srgbClr val="FF0000"/>
           </a:solidFill>
           <a:ln>
             <a:solidFill>
-              <a:schemeClr val="tx1"/>
+              <a:srgbClr val="FF0000"/>
             </a:solidFill>
           </a:ln>
         </p:spPr>

</xml_diff>